<commit_message>
Added more C files
</commit_message>
<xml_diff>
--- a/Laboratory_01/presentation.pptx
+++ b/Laboratory_01/presentation.pptx
@@ -7,7 +7,7 @@
     <p:sldMasterId id="2147483696" r:id="rId3"/>
   </p:sldMasterIdLst>
   <p:notesMasterIdLst>
-    <p:notesMasterId r:id="rId16"/>
+    <p:notesMasterId r:id="rId17"/>
   </p:notesMasterIdLst>
   <p:sldIdLst>
     <p:sldId id="365" r:id="rId4"/>
@@ -15,13 +15,14 @@
     <p:sldId id="366" r:id="rId6"/>
     <p:sldId id="367" r:id="rId7"/>
     <p:sldId id="368" r:id="rId8"/>
-    <p:sldId id="369" r:id="rId9"/>
-    <p:sldId id="370" r:id="rId10"/>
-    <p:sldId id="371" r:id="rId11"/>
-    <p:sldId id="372" r:id="rId12"/>
-    <p:sldId id="373" r:id="rId13"/>
-    <p:sldId id="374" r:id="rId14"/>
-    <p:sldId id="375" r:id="rId15"/>
+    <p:sldId id="376" r:id="rId9"/>
+    <p:sldId id="369" r:id="rId10"/>
+    <p:sldId id="370" r:id="rId11"/>
+    <p:sldId id="371" r:id="rId12"/>
+    <p:sldId id="372" r:id="rId13"/>
+    <p:sldId id="373" r:id="rId14"/>
+    <p:sldId id="374" r:id="rId15"/>
+    <p:sldId id="375" r:id="rId16"/>
   </p:sldIdLst>
   <p:sldSz cx="9144000" cy="6858000" type="screen4x3"/>
   <p:notesSz cx="6858000" cy="9144000"/>
@@ -1242,7 +1243,7 @@
             <a:fld id="{AEC33A89-294B-46C7-A21B-5AF2B86B8432}" type="datetime1">
               <a:rPr lang="en-US"/>
               <a:pPr/>
-              <a:t>1/28/2014</a:t>
+              <a:t>1/29/2014</a:t>
             </a:fld>
             <a:endParaRPr lang="en-US"/>
           </a:p>
@@ -1424,7 +1425,7 @@
             <a:fld id="{5FFB420C-30B2-44B4-98C6-B3B65B2BB310}" type="datetime1">
               <a:rPr lang="en-US"/>
               <a:pPr/>
-              <a:t>1/28/2014</a:t>
+              <a:t>1/29/2014</a:t>
             </a:fld>
             <a:endParaRPr lang="en-US"/>
           </a:p>
@@ -1682,7 +1683,7 @@
             <a:fld id="{E5EB5474-932D-40FB-A2B3-0BF27AB627F1}" type="datetime1">
               <a:rPr lang="en-US"/>
               <a:pPr/>
-              <a:t>1/28/2014</a:t>
+              <a:t>1/29/2014</a:t>
             </a:fld>
             <a:endParaRPr lang="en-US"/>
           </a:p>
@@ -1982,7 +1983,7 @@
             <a:fld id="{696EB352-98E3-4F9D-A891-773D1343378F}" type="datetime1">
               <a:rPr lang="en-US"/>
               <a:pPr/>
-              <a:t>1/28/2014</a:t>
+              <a:t>1/29/2014</a:t>
             </a:fld>
             <a:endParaRPr lang="en-US"/>
           </a:p>
@@ -2416,7 +2417,7 @@
             <a:fld id="{9E2A6ADD-0478-40DE-9944-545D3B9B7748}" type="datetime1">
               <a:rPr lang="en-US"/>
               <a:pPr/>
-              <a:t>1/28/2014</a:t>
+              <a:t>1/29/2014</a:t>
             </a:fld>
             <a:endParaRPr lang="en-US"/>
           </a:p>
@@ -2546,7 +2547,7 @@
             <a:fld id="{1B445FBD-F57C-4009-AD3F-DFD96447CDA0}" type="datetime1">
               <a:rPr lang="en-US"/>
               <a:pPr/>
-              <a:t>1/28/2014</a:t>
+              <a:t>1/29/2014</a:t>
             </a:fld>
             <a:endParaRPr lang="en-US"/>
           </a:p>
@@ -2653,7 +2654,7 @@
             <a:fld id="{5A2EB955-7AFA-4919-9E13-326EAEBC5515}" type="datetime1">
               <a:rPr lang="en-US"/>
               <a:pPr/>
-              <a:t>1/28/2014</a:t>
+              <a:t>1/29/2014</a:t>
             </a:fld>
             <a:endParaRPr lang="en-US"/>
           </a:p>
@@ -2942,7 +2943,7 @@
             <a:fld id="{16FCCAB3-BDD7-4DFB-8EB1-AB3E5AD01BAE}" type="datetime1">
               <a:rPr lang="en-US"/>
               <a:pPr/>
-              <a:t>1/28/2014</a:t>
+              <a:t>1/29/2014</a:t>
             </a:fld>
             <a:endParaRPr lang="en-US"/>
           </a:p>
@@ -3396,7 +3397,7 @@
             <a:fld id="{83E2EAC3-35D7-4416-8443-0D91FE32AE6B}" type="datetime1">
               <a:rPr lang="en-US"/>
               <a:pPr/>
-              <a:t>1/28/2014</a:t>
+              <a:t>1/29/2014</a:t>
             </a:fld>
             <a:endParaRPr lang="en-US"/>
           </a:p>
@@ -3578,7 +3579,7 @@
             <a:fld id="{914780E2-23A1-4C10-A855-7D9656F52859}" type="datetime1">
               <a:rPr lang="en-US"/>
               <a:pPr/>
-              <a:t>1/28/2014</a:t>
+              <a:t>1/29/2014</a:t>
             </a:fld>
             <a:endParaRPr lang="en-US"/>
           </a:p>
@@ -3770,7 +3771,7 @@
             <a:fld id="{11644E03-7E47-41A8-A260-B6B926C4CC7D}" type="datetime1">
               <a:rPr lang="en-US"/>
               <a:pPr/>
-              <a:t>1/28/2014</a:t>
+              <a:t>1/29/2014</a:t>
             </a:fld>
             <a:endParaRPr lang="en-US"/>
           </a:p>
@@ -4024,7 +4025,7 @@
             <a:fld id="{D5F7F537-0FE2-4055-A59F-9032C2A9E730}" type="datetime1">
               <a:rPr lang="en-US"/>
               <a:pPr/>
-              <a:t>1/28/2014</a:t>
+              <a:t>1/29/2014</a:t>
             </a:fld>
             <a:endParaRPr lang="en-US"/>
           </a:p>
@@ -4206,7 +4207,7 @@
             <a:fld id="{D3F64BF9-BAB3-434E-899B-6BA0D1EF025D}" type="datetime1">
               <a:rPr lang="en-US"/>
               <a:pPr/>
-              <a:t>1/28/2014</a:t>
+              <a:t>1/29/2014</a:t>
             </a:fld>
             <a:endParaRPr lang="en-US"/>
           </a:p>
@@ -4464,7 +4465,7 @@
             <a:fld id="{931F81CA-A927-425A-BA13-0089B3ED0C6D}" type="datetime1">
               <a:rPr lang="en-US"/>
               <a:pPr/>
-              <a:t>1/28/2014</a:t>
+              <a:t>1/29/2014</a:t>
             </a:fld>
             <a:endParaRPr lang="en-US"/>
           </a:p>
@@ -4764,7 +4765,7 @@
             <a:fld id="{A3113761-794A-421C-9F8F-94D4D23FA4D5}" type="datetime1">
               <a:rPr lang="en-US"/>
               <a:pPr/>
-              <a:t>1/28/2014</a:t>
+              <a:t>1/29/2014</a:t>
             </a:fld>
             <a:endParaRPr lang="en-US"/>
           </a:p>
@@ -5198,7 +5199,7 @@
             <a:fld id="{9D192414-5514-40FE-A06F-F5901215BD5D}" type="datetime1">
               <a:rPr lang="en-US"/>
               <a:pPr/>
-              <a:t>1/28/2014</a:t>
+              <a:t>1/29/2014</a:t>
             </a:fld>
             <a:endParaRPr lang="en-US"/>
           </a:p>
@@ -5328,7 +5329,7 @@
             <a:fld id="{C0D4DB4F-4B28-4A0D-8058-EF2BCA06D772}" type="datetime1">
               <a:rPr lang="en-US"/>
               <a:pPr/>
-              <a:t>1/28/2014</a:t>
+              <a:t>1/29/2014</a:t>
             </a:fld>
             <a:endParaRPr lang="en-US"/>
           </a:p>
@@ -5435,7 +5436,7 @@
             <a:fld id="{51F0974C-1D4C-4073-A377-6A7E855E9870}" type="datetime1">
               <a:rPr lang="en-US"/>
               <a:pPr/>
-              <a:t>1/28/2014</a:t>
+              <a:t>1/29/2014</a:t>
             </a:fld>
             <a:endParaRPr lang="en-US"/>
           </a:p>
@@ -5932,7 +5933,7 @@
             <a:fld id="{FEF7C396-336B-42EE-BA4D-0B8693827EB7}" type="datetime1">
               <a:rPr lang="en-US"/>
               <a:pPr/>
-              <a:t>1/28/2014</a:t>
+              <a:t>1/29/2014</a:t>
             </a:fld>
             <a:endParaRPr lang="en-US"/>
           </a:p>
@@ -6200,7 +6201,7 @@
             <a:fld id="{90FFEC2C-59E9-4A9F-BD77-08ED4DBC8131}" type="datetime1">
               <a:rPr lang="en-US"/>
               <a:pPr/>
-              <a:t>1/28/2014</a:t>
+              <a:t>1/29/2014</a:t>
             </a:fld>
             <a:endParaRPr lang="en-US"/>
           </a:p>
@@ -6382,7 +6383,7 @@
             <a:fld id="{796172B5-CCC8-4C8C-9D2D-863BD9FF60B7}" type="datetime1">
               <a:rPr lang="en-US"/>
               <a:pPr/>
-              <a:t>1/28/2014</a:t>
+              <a:t>1/29/2014</a:t>
             </a:fld>
             <a:endParaRPr lang="en-US"/>
           </a:p>
@@ -6574,7 +6575,7 @@
             <a:fld id="{65DD1979-C95E-4243-9356-9C05AE4C61AE}" type="datetime1">
               <a:rPr lang="en-US"/>
               <a:pPr/>
-              <a:t>1/28/2014</a:t>
+              <a:t>1/29/2014</a:t>
             </a:fld>
             <a:endParaRPr lang="en-US"/>
           </a:p>
@@ -9046,7 +9047,7 @@
             <a:fld id="{B238E12D-0547-428B-A2E0-592C1D52FC72}" type="datetime1">
               <a:rPr lang="en-US"/>
               <a:pPr/>
-              <a:t>1/28/2014</a:t>
+              <a:t>1/29/2014</a:t>
             </a:fld>
             <a:endParaRPr lang="en-US"/>
           </a:p>
@@ -9814,7 +9815,7 @@
             <a:fld id="{F35FF12B-5B7D-4A12-A7E1-738E46FB09FA}" type="datetime1">
               <a:rPr lang="en-US"/>
               <a:pPr/>
-              <a:t>1/28/2014</a:t>
+              <a:t>1/29/2014</a:t>
             </a:fld>
             <a:endParaRPr lang="en-US"/>
           </a:p>
@@ -10781,7 +10782,19 @@
               <a:rPr lang="en-US" b="1" dirty="0" smtClean="0">
                 <a:latin typeface="Lucida Sans" pitchFamily="34" charset="0"/>
               </a:rPr>
-              <a:t>Draw a Car , Motorcycle, Human or pet!</a:t>
+              <a:t>From Scratch for the Do it Your-</a:t>
+            </a:r>
+            <a:r>
+              <a:rPr lang="en-US" b="1" dirty="0" err="1" smtClean="0">
+                <a:latin typeface="Lucida Sans" pitchFamily="34" charset="0"/>
+              </a:rPr>
+              <a:t>selfer</a:t>
+            </a:r>
+            <a:r>
+              <a:rPr lang="en-US" b="1" dirty="0" smtClean="0">
+                <a:latin typeface="Lucida Sans" pitchFamily="34" charset="0"/>
+              </a:rPr>
+              <a:t/>
             </a:r>
             <a:br>
               <a:rPr lang="en-US" b="1" dirty="0" smtClean="0">
@@ -10807,7 +10820,19 @@
           <a:bodyPr/>
           <a:lstStyle/>
           <a:p>
-            <a:endParaRPr lang="en-GB" dirty="0"/>
+            <a:r>
+              <a:rPr lang="en-GB" dirty="0" smtClean="0">
+                <a:solidFill>
+                  <a:schemeClr val="tx1"/>
+                </a:solidFill>
+              </a:rPr>
+              <a:t>Follow TA</a:t>
+            </a:r>
+            <a:endParaRPr lang="en-GB" dirty="0">
+              <a:solidFill>
+                <a:schemeClr val="tx1"/>
+              </a:solidFill>
+            </a:endParaRPr>
           </a:p>
         </p:txBody>
       </p:sp>
@@ -10845,197 +10870,50 @@
       </p:grpSpPr>
       <p:sp>
         <p:nvSpPr>
-          <p:cNvPr id="39938" name="Text Box 6"/>
-          <p:cNvSpPr txBox="1">
-            <a:spLocks noChangeArrowheads="1"/>
-          </p:cNvSpPr>
-          <p:nvPr/>
-        </p:nvSpPr>
-        <p:spPr bwMode="auto">
-          <a:xfrm>
-            <a:off x="0" y="304800"/>
-            <a:ext cx="7010400" cy="584775"/>
-          </a:xfrm>
-          <a:prstGeom prst="rect">
-            <a:avLst/>
-          </a:prstGeom>
-          <a:noFill/>
-          <a:ln w="9525">
-            <a:noFill/>
-            <a:miter lim="800000"/>
-            <a:headEnd/>
-            <a:tailEnd/>
-          </a:ln>
-        </p:spPr>
-        <p:txBody>
-          <a:bodyPr>
-            <a:spAutoFit/>
-          </a:bodyPr>
+          <p:cNvPr id="7" name="Title 6"/>
+          <p:cNvSpPr>
+            <a:spLocks noGrp="1"/>
+          </p:cNvSpPr>
+          <p:nvPr>
+            <p:ph type="ctrTitle"/>
+          </p:nvPr>
+        </p:nvSpPr>
+        <p:spPr/>
+        <p:txBody>
+          <a:bodyPr/>
           <a:lstStyle/>
           <a:p>
             <a:r>
-              <a:rPr lang="en-US" sz="3200" b="1" dirty="0" smtClean="0">
+              <a:rPr lang="en-US" b="1" dirty="0" smtClean="0">
                 <a:latin typeface="Lucida Sans" pitchFamily="34" charset="0"/>
               </a:rPr>
-              <a:t>After Lab</a:t>
-            </a:r>
-            <a:endParaRPr lang="en-US" sz="3200" b="1" dirty="0">
-              <a:latin typeface="Lucida Sans" pitchFamily="34" charset="0"/>
-            </a:endParaRPr>
-          </a:p>
-        </p:txBody>
-      </p:sp>
-      <p:sp>
-        <p:nvSpPr>
-          <p:cNvPr id="4" name="Content Placeholder 3"/>
-          <p:cNvSpPr>
-            <a:spLocks noGrp="1"/>
-          </p:cNvSpPr>
-          <p:nvPr>
-            <p:ph idx="1"/>
-          </p:nvPr>
-        </p:nvSpPr>
-        <p:spPr>
-          <a:xfrm>
-            <a:off x="0" y="990600"/>
-            <a:ext cx="9144000" cy="5181600"/>
-          </a:xfrm>
-        </p:spPr>
-        <p:txBody>
-          <a:bodyPr/>
-          <a:lstStyle/>
-          <a:p>
-            <a:r>
-              <a:rPr lang="en-GB" sz="2800" dirty="0" smtClean="0">
+              <a:t>Draw a Car , Motorcycle, Human or pet!</a:t>
+            </a:r>
+            <a:br>
+              <a:rPr lang="en-US" b="1" dirty="0" smtClean="0">
                 <a:latin typeface="Lucida Sans" pitchFamily="34" charset="0"/>
               </a:rPr>
-              <a:t>Investigate </a:t>
-            </a:r>
-            <a:r>
-              <a:rPr lang="en-GB" sz="2800" dirty="0" smtClean="0">
-                <a:latin typeface="Lucida Sans" pitchFamily="34" charset="0"/>
-              </a:rPr>
-              <a:t>what </a:t>
-            </a:r>
-            <a:r>
-              <a:rPr lang="en-GB" sz="2800" dirty="0" smtClean="0">
-                <a:latin typeface="Lucida Sans" pitchFamily="34" charset="0"/>
-              </a:rPr>
-              <a:t>Widgets are </a:t>
-            </a:r>
-            <a:r>
-              <a:rPr lang="en-GB" sz="2800" dirty="0" smtClean="0">
-                <a:latin typeface="Lucida Sans" pitchFamily="34" charset="0"/>
-              </a:rPr>
-              <a:t>and what features the </a:t>
-            </a:r>
-            <a:r>
-              <a:rPr lang="en-GB" sz="2800" dirty="0" err="1" smtClean="0">
-                <a:latin typeface="Lucida Sans" pitchFamily="34" charset="0"/>
-              </a:rPr>
-              <a:t>Swt</a:t>
-            </a:r>
-            <a:r>
-              <a:rPr lang="en-GB" sz="2800" dirty="0" smtClean="0">
-                <a:latin typeface="Lucida Sans" pitchFamily="34" charset="0"/>
-              </a:rPr>
-              <a:t> package has.</a:t>
-            </a:r>
-            <a:endParaRPr lang="en-GB" sz="2800" dirty="0" smtClean="0">
-              <a:latin typeface="Lucida Sans" pitchFamily="34" charset="0"/>
-            </a:endParaRPr>
-          </a:p>
-          <a:p>
-            <a:r>
-              <a:rPr lang="en-GB" sz="2800" dirty="0" smtClean="0">
-                <a:latin typeface="Lucida Sans" pitchFamily="34" charset="0"/>
-              </a:rPr>
-              <a:t>Investigate important features of the Swing Pack age.</a:t>
-            </a:r>
-            <a:endParaRPr lang="en-GB" sz="2800" dirty="0" smtClean="0">
-              <a:latin typeface="Lucida Sans" pitchFamily="34" charset="0"/>
-            </a:endParaRPr>
-          </a:p>
-          <a:p>
-            <a:r>
-              <a:rPr lang="en-GB" sz="2800" dirty="0" smtClean="0">
-                <a:latin typeface="Lucida Sans" pitchFamily="34" charset="0"/>
-              </a:rPr>
-              <a:t>Investigate important features of the </a:t>
-            </a:r>
-            <a:r>
-              <a:rPr lang="en-GB" sz="2800" dirty="0" err="1" smtClean="0">
-                <a:latin typeface="Lucida Sans" pitchFamily="34" charset="0"/>
-              </a:rPr>
-              <a:t>Awt</a:t>
-            </a:r>
-            <a:r>
-              <a:rPr lang="en-GB" sz="2800" dirty="0" smtClean="0">
-                <a:latin typeface="Lucida Sans" pitchFamily="34" charset="0"/>
-              </a:rPr>
-              <a:t> package.</a:t>
-            </a:r>
-          </a:p>
-          <a:p>
-            <a:endParaRPr lang="en-GB" sz="2800" dirty="0" smtClean="0">
-              <a:latin typeface="Lucida Sans" pitchFamily="34" charset="0"/>
-            </a:endParaRPr>
-          </a:p>
-          <a:p>
-            <a:r>
-              <a:rPr lang="en-GB" sz="2800" dirty="0" smtClean="0">
-                <a:latin typeface="Lucida Sans" pitchFamily="34" charset="0"/>
-              </a:rPr>
-              <a:t>Optional:</a:t>
-            </a:r>
-          </a:p>
-          <a:p>
-            <a:pPr lvl="1"/>
-            <a:r>
-              <a:rPr lang="en-GB" sz="2000" dirty="0" smtClean="0">
-                <a:latin typeface="Lucida Sans" pitchFamily="34" charset="0"/>
-              </a:rPr>
-              <a:t>git </a:t>
-            </a:r>
-            <a:r>
-              <a:rPr lang="en-GB" sz="2000" dirty="0" smtClean="0">
-                <a:latin typeface="Lucida Sans" pitchFamily="34" charset="0"/>
-              </a:rPr>
-              <a:t>clone </a:t>
-            </a:r>
-            <a:r>
-              <a:rPr lang="en-GB" sz="2000" dirty="0" smtClean="0">
-                <a:latin typeface="Lucida Sans" pitchFamily="34" charset="0"/>
-                <a:hlinkClick r:id="rId2"/>
-              </a:rPr>
-              <a:t>https://</a:t>
-            </a:r>
-            <a:r>
-              <a:rPr lang="en-GB" sz="2000" dirty="0" smtClean="0">
-                <a:latin typeface="Lucida Sans" pitchFamily="34" charset="0"/>
-                <a:hlinkClick r:id="rId2"/>
-              </a:rPr>
-              <a:t>github.com/Apo45ty/ICOM4015LABS.git</a:t>
-            </a:r>
-            <a:endParaRPr lang="en-GB" sz="2800" dirty="0" smtClean="0">
-              <a:latin typeface="Lucida Sans" pitchFamily="34" charset="0"/>
-            </a:endParaRPr>
-          </a:p>
-          <a:p>
-            <a:endParaRPr lang="en-GB" sz="2800" dirty="0" smtClean="0">
-              <a:latin typeface="Lucida Sans" pitchFamily="34" charset="0"/>
-            </a:endParaRPr>
-          </a:p>
-          <a:p>
-            <a:r>
-              <a:rPr lang="en-GB" sz="2800" b="1" dirty="0" smtClean="0">
-                <a:solidFill>
-                  <a:srgbClr val="FF0000"/>
-                </a:solidFill>
-                <a:latin typeface="Lucida Sans" pitchFamily="34" charset="0"/>
-              </a:rPr>
-              <a:t>Evaluation Sheet</a:t>
-            </a:r>
+            </a:br>
+            <a:endParaRPr lang="en-GB" dirty="0"/>
+          </a:p>
+        </p:txBody>
+      </p:sp>
+      <p:sp>
+        <p:nvSpPr>
+          <p:cNvPr id="8" name="Subtitle 7"/>
+          <p:cNvSpPr>
+            <a:spLocks noGrp="1"/>
+          </p:cNvSpPr>
+          <p:nvPr>
+            <p:ph type="subTitle" idx="1"/>
+          </p:nvPr>
+        </p:nvSpPr>
+        <p:spPr/>
+        <p:txBody>
+          <a:bodyPr/>
+          <a:lstStyle/>
+          <a:p>
+            <a:endParaRPr lang="en-GB" dirty="0"/>
           </a:p>
         </p:txBody>
       </p:sp>
@@ -11073,6 +10951,197 @@
       </p:grpSpPr>
       <p:sp>
         <p:nvSpPr>
+          <p:cNvPr id="39938" name="Text Box 6"/>
+          <p:cNvSpPr txBox="1">
+            <a:spLocks noChangeArrowheads="1"/>
+          </p:cNvSpPr>
+          <p:nvPr/>
+        </p:nvSpPr>
+        <p:spPr bwMode="auto">
+          <a:xfrm>
+            <a:off x="0" y="304800"/>
+            <a:ext cx="7010400" cy="584775"/>
+          </a:xfrm>
+          <a:prstGeom prst="rect">
+            <a:avLst/>
+          </a:prstGeom>
+          <a:noFill/>
+          <a:ln w="9525">
+            <a:noFill/>
+            <a:miter lim="800000"/>
+            <a:headEnd/>
+            <a:tailEnd/>
+          </a:ln>
+        </p:spPr>
+        <p:txBody>
+          <a:bodyPr>
+            <a:spAutoFit/>
+          </a:bodyPr>
+          <a:lstStyle/>
+          <a:p>
+            <a:r>
+              <a:rPr lang="en-US" sz="3200" b="1" dirty="0" smtClean="0">
+                <a:latin typeface="Lucida Sans" pitchFamily="34" charset="0"/>
+              </a:rPr>
+              <a:t>After Lab</a:t>
+            </a:r>
+            <a:endParaRPr lang="en-US" sz="3200" b="1" dirty="0">
+              <a:latin typeface="Lucida Sans" pitchFamily="34" charset="0"/>
+            </a:endParaRPr>
+          </a:p>
+        </p:txBody>
+      </p:sp>
+      <p:sp>
+        <p:nvSpPr>
+          <p:cNvPr id="4" name="Content Placeholder 3"/>
+          <p:cNvSpPr>
+            <a:spLocks noGrp="1"/>
+          </p:cNvSpPr>
+          <p:nvPr>
+            <p:ph idx="1"/>
+          </p:nvPr>
+        </p:nvSpPr>
+        <p:spPr>
+          <a:xfrm>
+            <a:off x="0" y="990600"/>
+            <a:ext cx="9144000" cy="5181600"/>
+          </a:xfrm>
+        </p:spPr>
+        <p:txBody>
+          <a:bodyPr/>
+          <a:lstStyle/>
+          <a:p>
+            <a:r>
+              <a:rPr lang="en-GB" sz="2800" dirty="0" smtClean="0">
+                <a:latin typeface="Lucida Sans" pitchFamily="34" charset="0"/>
+              </a:rPr>
+              <a:t>Investigate what Widgets are and what features the </a:t>
+            </a:r>
+            <a:r>
+              <a:rPr lang="en-GB" sz="2800" dirty="0" err="1" smtClean="0">
+                <a:latin typeface="Lucida Sans" pitchFamily="34" charset="0"/>
+              </a:rPr>
+              <a:t>Swt</a:t>
+            </a:r>
+            <a:r>
+              <a:rPr lang="en-GB" sz="2800" dirty="0" smtClean="0">
+                <a:latin typeface="Lucida Sans" pitchFamily="34" charset="0"/>
+              </a:rPr>
+              <a:t> package has.</a:t>
+            </a:r>
+          </a:p>
+          <a:p>
+            <a:r>
+              <a:rPr lang="en-GB" sz="2800" dirty="0" smtClean="0">
+                <a:latin typeface="Lucida Sans" pitchFamily="34" charset="0"/>
+              </a:rPr>
+              <a:t>Investigate important features of the Swing Pack age.</a:t>
+            </a:r>
+          </a:p>
+          <a:p>
+            <a:r>
+              <a:rPr lang="en-GB" sz="2800" dirty="0" smtClean="0">
+                <a:latin typeface="Lucida Sans" pitchFamily="34" charset="0"/>
+              </a:rPr>
+              <a:t>Investigate important features of the </a:t>
+            </a:r>
+            <a:r>
+              <a:rPr lang="en-GB" sz="2800" dirty="0" err="1" smtClean="0">
+                <a:latin typeface="Lucida Sans" pitchFamily="34" charset="0"/>
+              </a:rPr>
+              <a:t>Awt</a:t>
+            </a:r>
+            <a:r>
+              <a:rPr lang="en-GB" sz="2800" dirty="0" smtClean="0">
+                <a:latin typeface="Lucida Sans" pitchFamily="34" charset="0"/>
+              </a:rPr>
+              <a:t> package.</a:t>
+            </a:r>
+          </a:p>
+          <a:p>
+            <a:endParaRPr lang="en-GB" sz="2800" dirty="0" smtClean="0">
+              <a:latin typeface="Lucida Sans" pitchFamily="34" charset="0"/>
+            </a:endParaRPr>
+          </a:p>
+          <a:p>
+            <a:r>
+              <a:rPr lang="en-GB" sz="2800" dirty="0" smtClean="0">
+                <a:latin typeface="Lucida Sans" pitchFamily="34" charset="0"/>
+              </a:rPr>
+              <a:t>Optional:</a:t>
+            </a:r>
+          </a:p>
+          <a:p>
+            <a:pPr lvl="1"/>
+            <a:r>
+              <a:rPr lang="en-GB" sz="2000" dirty="0" smtClean="0">
+                <a:latin typeface="Lucida Sans" pitchFamily="34" charset="0"/>
+              </a:rPr>
+              <a:t>git clone </a:t>
+            </a:r>
+            <a:r>
+              <a:rPr lang="en-GB" sz="2000" dirty="0" smtClean="0">
+                <a:latin typeface="Lucida Sans" pitchFamily="34" charset="0"/>
+                <a:hlinkClick r:id="rId2"/>
+              </a:rPr>
+              <a:t>https://github.com/Apo45ty/ICOM4015LABS.git</a:t>
+            </a:r>
+            <a:endParaRPr lang="en-GB" sz="2800" dirty="0" smtClean="0">
+              <a:latin typeface="Lucida Sans" pitchFamily="34" charset="0"/>
+            </a:endParaRPr>
+          </a:p>
+          <a:p>
+            <a:endParaRPr lang="en-GB" sz="2800" dirty="0" smtClean="0">
+              <a:latin typeface="Lucida Sans" pitchFamily="34" charset="0"/>
+            </a:endParaRPr>
+          </a:p>
+          <a:p>
+            <a:r>
+              <a:rPr lang="en-GB" sz="2800" b="1" dirty="0" smtClean="0">
+                <a:solidFill>
+                  <a:srgbClr val="FF0000"/>
+                </a:solidFill>
+                <a:latin typeface="Lucida Sans" pitchFamily="34" charset="0"/>
+              </a:rPr>
+              <a:t>Evaluation Sheet</a:t>
+            </a:r>
+          </a:p>
+        </p:txBody>
+      </p:sp>
+    </p:spTree>
+  </p:cSld>
+  <p:clrMapOvr>
+    <a:masterClrMapping/>
+  </p:clrMapOvr>
+  <p:timing>
+    <p:tnLst>
+      <p:par>
+        <p:cTn id="1" dur="indefinite" restart="never" nodeType="tmRoot"/>
+      </p:par>
+    </p:tnLst>
+  </p:timing>
+</p:sld>
+</file>
+
+<file path=ppt/slides/slide13.xml><?xml version="1.0" encoding="utf-8"?>
+<p:sld xmlns:a="http://schemas.openxmlformats.org/drawingml/2006/main" xmlns:r="http://schemas.openxmlformats.org/officeDocument/2006/relationships" xmlns:p="http://schemas.openxmlformats.org/presentationml/2006/main">
+  <p:cSld>
+    <p:spTree>
+      <p:nvGrpSpPr>
+        <p:cNvPr id="1" name=""/>
+        <p:cNvGrpSpPr/>
+        <p:nvPr/>
+      </p:nvGrpSpPr>
+      <p:grpSpPr>
+        <a:xfrm>
+          <a:off x="0" y="0"/>
+          <a:ext cx="0" cy="0"/>
+          <a:chOff x="0" y="0"/>
+          <a:chExt cx="0" cy="0"/>
+        </a:xfrm>
+      </p:grpSpPr>
+      <p:sp>
+        <p:nvSpPr>
           <p:cNvPr id="2" name="Title 1"/>
           <p:cNvSpPr>
             <a:spLocks noGrp="1"/>
@@ -11385,25 +11454,7 @@
               <a:rPr lang="en-GB" sz="3200" b="1" dirty="0" smtClean="0">
                 <a:latin typeface="Lucida Sans" pitchFamily="34" charset="0"/>
               </a:rPr>
-              <a:t>Pseudo Code </a:t>
-            </a:r>
-            <a:r>
-              <a:rPr lang="en-GB" sz="3200" b="1" dirty="0" smtClean="0">
-                <a:latin typeface="Lucida Sans" pitchFamily="34" charset="0"/>
-              </a:rPr>
-              <a:t>and</a:t>
-            </a:r>
-            <a:r>
-              <a:rPr lang="en-GB" sz="3200" b="1" dirty="0" smtClean="0">
-                <a:latin typeface="Lucida Sans" pitchFamily="34" charset="0"/>
-              </a:rPr>
-              <a:t> </a:t>
-            </a:r>
-            <a:r>
-              <a:rPr lang="en-GB" sz="3200" b="1" dirty="0" smtClean="0">
-                <a:latin typeface="Lucida Sans" pitchFamily="34" charset="0"/>
-              </a:rPr>
-              <a:t>Flow Charts</a:t>
+              <a:t>Pseudo Code and Flow Charts</a:t>
             </a:r>
             <a:endParaRPr lang="en-US" sz="3200" b="1" dirty="0">
               <a:latin typeface="Lucida Sans" pitchFamily="34" charset="0"/>
@@ -11456,19 +11507,7 @@
               <a:rPr lang="en-GB" sz="2200" dirty="0" smtClean="0">
                 <a:latin typeface="Lucida Sans" pitchFamily="34" charset="0"/>
               </a:rPr>
-              <a:t>is </a:t>
-            </a:r>
-            <a:r>
-              <a:rPr lang="en-GB" sz="2200" dirty="0" smtClean="0">
-                <a:latin typeface="Lucida Sans" pitchFamily="34" charset="0"/>
-              </a:rPr>
-              <a:t>an informal high-level description of the operating principle of a computer program or other algorithm</a:t>
-            </a:r>
-            <a:r>
-              <a:rPr lang="en-GB" sz="2200" dirty="0" smtClean="0">
-                <a:latin typeface="Lucida Sans" pitchFamily="34" charset="0"/>
-              </a:rPr>
-              <a:t>.[1]</a:t>
+              <a:t>is an informal high-level description of the operating principle of a computer program or other algorithm.[1]</a:t>
             </a:r>
           </a:p>
           <a:p>
@@ -11483,19 +11522,7 @@
               <a:rPr lang="en-GB" sz="2200" dirty="0" smtClean="0">
                 <a:latin typeface="Lucida Sans" pitchFamily="34" charset="0"/>
               </a:rPr>
-              <a:t> </a:t>
-            </a:r>
-            <a:r>
-              <a:rPr lang="en-GB" sz="2200" dirty="0" smtClean="0">
-                <a:latin typeface="Lucida Sans" pitchFamily="34" charset="0"/>
-              </a:rPr>
-              <a:t>typically omits details that are not essential for human understanding of the algorithm, such as variable declarations, system-specific code and some subroutines. </a:t>
-            </a:r>
-            <a:r>
-              <a:rPr lang="en-GB" sz="2200" dirty="0" smtClean="0">
-                <a:latin typeface="Lucida Sans" pitchFamily="34" charset="0"/>
-              </a:rPr>
-              <a:t>[1]</a:t>
+              <a:t> typically omits details that are not essential for human understanding of the algorithm, such as variable declarations, system-specific code and some subroutines. [1]</a:t>
             </a:r>
           </a:p>
           <a:p>
@@ -11509,19 +11536,7 @@
               <a:rPr lang="en-GB" sz="2400" b="1" dirty="0" smtClean="0">
                 <a:latin typeface="Lucida Sans" pitchFamily="34" charset="0"/>
               </a:rPr>
-              <a:t>A </a:t>
-            </a:r>
-            <a:r>
-              <a:rPr lang="en-GB" sz="2400" b="1" dirty="0" smtClean="0">
-                <a:latin typeface="Lucida Sans" pitchFamily="34" charset="0"/>
-              </a:rPr>
-              <a:t>F</a:t>
-            </a:r>
-            <a:r>
-              <a:rPr lang="en-GB" sz="2400" b="1" dirty="0" smtClean="0">
-                <a:latin typeface="Lucida Sans" pitchFamily="34" charset="0"/>
-              </a:rPr>
-              <a:t>lowchart</a:t>
+              <a:t>A Flowchart</a:t>
             </a:r>
           </a:p>
           <a:p>
@@ -11536,19 +11551,7 @@
               <a:rPr lang="en-GB" sz="2200" dirty="0" smtClean="0">
                 <a:latin typeface="Lucida Sans" pitchFamily="34" charset="0"/>
               </a:rPr>
-              <a:t>It is </a:t>
-            </a:r>
-            <a:r>
-              <a:rPr lang="en-GB" sz="2200" dirty="0" smtClean="0">
-                <a:latin typeface="Lucida Sans" pitchFamily="34" charset="0"/>
-              </a:rPr>
-              <a:t>a type of diagram that represents an algorithm or process, showing the steps as boxes of various kinds, and their order by connecting them with arrows. </a:t>
-            </a:r>
-            <a:r>
-              <a:rPr lang="en-GB" sz="2200" dirty="0" smtClean="0">
-                <a:latin typeface="Lucida Sans" pitchFamily="34" charset="0"/>
-              </a:rPr>
-              <a:t>[1]	</a:t>
+              <a:t>It is a type of diagram that represents an algorithm or process, showing the steps as boxes of various kinds, and their order by connecting them with arrows. [1]	</a:t>
             </a:r>
             <a:r>
               <a:rPr lang="en-GB" sz="2000" dirty="0" smtClean="0">
@@ -11556,9 +11559,6 @@
               </a:rPr>
               <a:t>	</a:t>
             </a:r>
-            <a:endParaRPr lang="en-GB" sz="2000" dirty="0" smtClean="0">
-              <a:latin typeface="Lucida Sans" pitchFamily="34" charset="0"/>
-            </a:endParaRPr>
           </a:p>
         </p:txBody>
       </p:sp>
@@ -11666,43 +11666,13 @@
               <a:rPr lang="en-GB" sz="2400" b="1" i="1" dirty="0" smtClean="0">
                 <a:latin typeface="Lucida Sans" pitchFamily="34" charset="0"/>
               </a:rPr>
-              <a:t>algorithm is a sequence of unambiguous instructions for solving </a:t>
-            </a:r>
-            <a:r>
-              <a:rPr lang="en-GB" sz="2400" b="1" i="1" dirty="0" smtClean="0">
-                <a:latin typeface="Lucida Sans" pitchFamily="34" charset="0"/>
-              </a:rPr>
-              <a:t>a </a:t>
+              <a:t>algorithm is a sequence of unambiguous instructions for solving a </a:t>
             </a:r>
             <a:r>
               <a:rPr lang="en-GB" sz="2400" dirty="0" smtClean="0">
                 <a:latin typeface="Lucida Sans" pitchFamily="34" charset="0"/>
               </a:rPr>
-              <a:t>problem</a:t>
-            </a:r>
-            <a:r>
-              <a:rPr lang="en-GB" sz="2400" dirty="0" smtClean="0">
-                <a:latin typeface="Lucida Sans" pitchFamily="34" charset="0"/>
-              </a:rPr>
-              <a:t>, i.e., for obtaining a required output for any legitimate input </a:t>
-            </a:r>
-            <a:r>
-              <a:rPr lang="en-GB" sz="2400" dirty="0" smtClean="0">
-                <a:latin typeface="Lucida Sans" pitchFamily="34" charset="0"/>
-              </a:rPr>
-              <a:t>in a </a:t>
-            </a:r>
-            <a:r>
-              <a:rPr lang="en-GB" sz="2400" dirty="0" smtClean="0">
-                <a:latin typeface="Lucida Sans" pitchFamily="34" charset="0"/>
-              </a:rPr>
-              <a:t>finite amount of time</a:t>
-            </a:r>
-            <a:r>
-              <a:rPr lang="en-GB" sz="2400" dirty="0" smtClean="0">
-                <a:latin typeface="Lucida Sans" pitchFamily="34" charset="0"/>
-              </a:rPr>
-              <a:t>. [2]</a:t>
+              <a:t>problem, i.e., for obtaining a required output for any legitimate input in a finite amount of time. [2]</a:t>
             </a:r>
             <a:endParaRPr lang="en-GB" sz="2400" dirty="0">
               <a:latin typeface="Lucida Sans" pitchFamily="34" charset="0"/>
@@ -11843,27 +11813,7 @@
             </a:br>
             <a:r>
               <a:rPr lang="en-GB" dirty="0" smtClean="0"/>
-              <a:t>To receive </a:t>
-            </a:r>
-            <a:r>
-              <a:rPr lang="en-GB" dirty="0" smtClean="0"/>
-              <a:t>an integer number </a:t>
-            </a:r>
-            <a:r>
-              <a:rPr lang="en-GB" dirty="0" smtClean="0"/>
-              <a:t>between </a:t>
-            </a:r>
-            <a:r>
-              <a:rPr lang="en-GB" dirty="0" smtClean="0"/>
-              <a:t>10 </a:t>
-            </a:r>
-            <a:r>
-              <a:rPr lang="en-GB" dirty="0" smtClean="0"/>
-              <a:t>and 250 and </a:t>
-            </a:r>
-            <a:r>
-              <a:rPr lang="en-GB" dirty="0" smtClean="0"/>
-              <a:t>determine if it is a prime number or not.</a:t>
+              <a:t>To receive an integer number between 10 and 250 and determine if it is a prime number or not.</a:t>
             </a:r>
           </a:p>
           <a:p>
@@ -11974,15 +11924,7 @@
                   <a:schemeClr val="bg1"/>
                 </a:solidFill>
               </a:rPr>
-              <a:t>f</a:t>
-            </a:r>
-            <a:r>
-              <a:rPr lang="en-GB" sz="2200" dirty="0" smtClean="0">
-                <a:solidFill>
-                  <a:schemeClr val="bg1"/>
-                </a:solidFill>
-              </a:rPr>
-              <a:t>or </a:t>
+              <a:t>for </a:t>
             </a:r>
             <a:r>
               <a:rPr lang="en-GB" sz="2200" dirty="0" err="1" smtClean="0">
@@ -12027,15 +11969,7 @@
                   <a:schemeClr val="bg1"/>
                 </a:solidFill>
               </a:rPr>
-              <a:t>	</a:t>
-            </a:r>
-            <a:r>
-              <a:rPr lang="en-GB" sz="2200" dirty="0" smtClean="0">
-                <a:solidFill>
-                  <a:schemeClr val="bg1"/>
-                </a:solidFill>
-              </a:rPr>
-              <a:t>modulus = mod(</a:t>
+              <a:t>	modulus = mod(</a:t>
             </a:r>
             <a:r>
               <a:rPr lang="en-GB" sz="2200" dirty="0" err="1" smtClean="0">
@@ -12064,15 +11998,20 @@
                   <a:schemeClr val="bg1"/>
                 </a:solidFill>
               </a:rPr>
-              <a:t>	</a:t>
-            </a:r>
+              <a:t>	if (modulus == 0) then </a:t>
+            </a:r>
+          </a:p>
+          <a:p>
+            <a:pPr>
+              <a:buNone/>
+            </a:pPr>
             <a:r>
               <a:rPr lang="en-GB" sz="2200" dirty="0" smtClean="0">
                 <a:solidFill>
                   <a:schemeClr val="bg1"/>
                 </a:solidFill>
               </a:rPr>
-              <a:t>if (modulus == 0) then </a:t>
+              <a:t>			print (“Not prime”)</a:t>
             </a:r>
           </a:p>
           <a:p>
@@ -12085,36 +12024,7 @@
                   <a:schemeClr val="bg1"/>
                 </a:solidFill>
               </a:rPr>
-              <a:t>	</a:t>
-            </a:r>
-            <a:r>
-              <a:rPr lang="en-GB" sz="2200" dirty="0" smtClean="0">
-                <a:solidFill>
-                  <a:schemeClr val="bg1"/>
-                </a:solidFill>
-              </a:rPr>
-              <a:t>		print (“Not prime”)</a:t>
-            </a:r>
-          </a:p>
-          <a:p>
-            <a:pPr>
-              <a:buNone/>
-            </a:pPr>
-            <a:r>
-              <a:rPr lang="en-GB" sz="2200" dirty="0" smtClean="0">
-                <a:solidFill>
-                  <a:schemeClr val="bg1"/>
-                </a:solidFill>
-              </a:rPr>
-              <a:t>	</a:t>
-            </a:r>
-            <a:r>
-              <a:rPr lang="en-GB" sz="2200" dirty="0" smtClean="0">
-                <a:solidFill>
-                  <a:schemeClr val="bg1"/>
-                </a:solidFill>
-              </a:rPr>
-              <a:t>		end program</a:t>
+              <a:t>			end program</a:t>
             </a:r>
           </a:p>
           <a:p>
@@ -12140,15 +12050,7 @@
                   <a:schemeClr val="bg1"/>
                 </a:solidFill>
               </a:rPr>
-              <a:t>e</a:t>
-            </a:r>
-            <a:r>
-              <a:rPr lang="en-GB" sz="2200" dirty="0" smtClean="0">
-                <a:solidFill>
-                  <a:schemeClr val="bg1"/>
-                </a:solidFill>
-              </a:rPr>
-              <a:t>nd for</a:t>
+              <a:t>end for</a:t>
             </a:r>
           </a:p>
           <a:p>
@@ -12173,11 +12075,6 @@
               </a:rPr>
               <a:t>print (“Yeah, a Prime”)</a:t>
             </a:r>
-            <a:endParaRPr lang="en-GB" sz="2200" dirty="0" smtClean="0">
-              <a:solidFill>
-                <a:schemeClr val="bg1"/>
-              </a:solidFill>
-            </a:endParaRPr>
           </a:p>
           <a:p>
             <a:pPr>
@@ -12189,15 +12086,7 @@
                   <a:schemeClr val="bg1"/>
                 </a:solidFill>
               </a:rPr>
-              <a:t>end </a:t>
-            </a:r>
-            <a:r>
-              <a:rPr lang="en-GB" sz="2200" dirty="0" smtClean="0">
-                <a:solidFill>
-                  <a:schemeClr val="bg1"/>
-                </a:solidFill>
-              </a:rPr>
-              <a:t>program</a:t>
+              <a:t>end program</a:t>
             </a:r>
           </a:p>
           <a:p>
@@ -12246,7 +12135,7 @@
       </p:grpSpPr>
       <p:sp>
         <p:nvSpPr>
-          <p:cNvPr id="39938" name="Text Box 6"/>
+          <p:cNvPr id="7" name="Text Box 6"/>
           <p:cNvSpPr txBox="1">
             <a:spLocks noChangeArrowheads="1"/>
           </p:cNvSpPr>
@@ -12278,7 +12167,13 @@
               <a:rPr lang="en-GB" sz="3200" b="1" dirty="0" smtClean="0">
                 <a:latin typeface="Lucida Sans" pitchFamily="34" charset="0"/>
               </a:rPr>
-              <a:t>Eclipse IDE</a:t>
+              <a:t>Exercise </a:t>
+            </a:r>
+            <a:r>
+              <a:rPr lang="en-GB" sz="3200" b="1" dirty="0" smtClean="0">
+                <a:latin typeface="Lucida Sans" pitchFamily="34" charset="0"/>
+              </a:rPr>
+              <a:t>1: Flowchart</a:t>
             </a:r>
             <a:endParaRPr lang="en-US" sz="3200" b="1" dirty="0">
               <a:latin typeface="Lucida Sans" pitchFamily="34" charset="0"/>
@@ -12288,172 +12183,936 @@
       </p:sp>
       <p:sp>
         <p:nvSpPr>
-          <p:cNvPr id="4" name="Content Placeholder 3"/>
-          <p:cNvSpPr>
-            <a:spLocks noGrp="1"/>
-          </p:cNvSpPr>
-          <p:nvPr>
-            <p:ph idx="1"/>
-          </p:nvPr>
+          <p:cNvPr id="8" name="Oval 7"/>
+          <p:cNvSpPr/>
+          <p:nvPr/>
         </p:nvSpPr>
         <p:spPr>
           <a:xfrm>
-            <a:off x="0" y="838200"/>
-            <a:ext cx="9144000" cy="5562600"/>
+            <a:off x="1371600" y="990600"/>
+            <a:ext cx="1371600" cy="533400"/>
           </a:xfrm>
+          <a:prstGeom prst="ellipse">
+            <a:avLst/>
+          </a:prstGeom>
         </p:spPr>
-        <p:txBody>
-          <a:bodyPr/>
+        <p:style>
+          <a:lnRef idx="1">
+            <a:schemeClr val="accent1"/>
+          </a:lnRef>
+          <a:fillRef idx="3">
+            <a:schemeClr val="accent1"/>
+          </a:fillRef>
+          <a:effectRef idx="2">
+            <a:schemeClr val="accent1"/>
+          </a:effectRef>
+          <a:fontRef idx="minor">
+            <a:schemeClr val="lt1"/>
+          </a:fontRef>
+        </p:style>
+        <p:txBody>
+          <a:bodyPr rtlCol="0" anchor="ctr"/>
           <a:lstStyle/>
           <a:p>
-            <a:pPr marL="0">
-              <a:spcBef>
-                <a:spcPts val="0"/>
-              </a:spcBef>
-              <a:buNone/>
-            </a:pPr>
-            <a:r>
-              <a:rPr lang="en-GB" sz="2400" dirty="0" smtClean="0"/>
-              <a:t>In </a:t>
-            </a:r>
-            <a:r>
-              <a:rPr lang="en-GB" sz="2400" dirty="0" smtClean="0"/>
-              <a:t>contrast </a:t>
-            </a:r>
-            <a:r>
-              <a:rPr lang="en-GB" sz="2400" dirty="0" smtClean="0"/>
-              <a:t>to your previous programming experience we will be using an </a:t>
-            </a:r>
-            <a:r>
-              <a:rPr lang="en-GB" sz="2400" dirty="0" smtClean="0"/>
-              <a:t>Integrated Development Environment </a:t>
-            </a:r>
-            <a:r>
-              <a:rPr lang="en-GB" sz="2400" dirty="0" smtClean="0"/>
-              <a:t> called Eclipse. Because it’s an IDE it </a:t>
-            </a:r>
-            <a:r>
-              <a:rPr lang="en-GB" sz="2400" dirty="0" smtClean="0"/>
-              <a:t>does </a:t>
-            </a:r>
-            <a:r>
-              <a:rPr lang="en-GB" sz="2400" dirty="0" smtClean="0"/>
-              <a:t>way more </a:t>
-            </a:r>
-            <a:r>
-              <a:rPr lang="en-GB" sz="2400" dirty="0" smtClean="0"/>
-              <a:t>than compile your </a:t>
-            </a:r>
-            <a:r>
-              <a:rPr lang="en-GB" sz="2400" dirty="0" smtClean="0"/>
-              <a:t>code; it automates </a:t>
-            </a:r>
-            <a:r>
-              <a:rPr lang="en-GB" sz="2400" dirty="0" smtClean="0"/>
-              <a:t>tasks and make your life </a:t>
-            </a:r>
-            <a:r>
-              <a:rPr lang="en-GB" sz="2400" dirty="0" smtClean="0"/>
-              <a:t>easy. Eclipse sole purpose in life is to </a:t>
-            </a:r>
-            <a:r>
-              <a:rPr lang="en-GB" sz="2400" dirty="0" smtClean="0"/>
-              <a:t>organize </a:t>
-            </a:r>
-            <a:r>
-              <a:rPr lang="en-GB" sz="2400" dirty="0" smtClean="0"/>
-              <a:t>you and </a:t>
-            </a:r>
-            <a:r>
-              <a:rPr lang="en-GB" sz="2400" dirty="0" smtClean="0"/>
-              <a:t>get you a </a:t>
-            </a:r>
-            <a:r>
-              <a:rPr lang="en-GB" sz="2400" dirty="0" smtClean="0"/>
-              <a:t>workflow. </a:t>
-            </a:r>
-          </a:p>
-          <a:p>
-            <a:pPr marL="0">
-              <a:spcBef>
-                <a:spcPts val="0"/>
-              </a:spcBef>
-            </a:pPr>
-            <a:endParaRPr lang="en-GB" sz="2400" dirty="0" smtClean="0"/>
-          </a:p>
-          <a:p>
-            <a:pPr marL="0">
-              <a:spcBef>
-                <a:spcPts val="0"/>
-              </a:spcBef>
-            </a:pPr>
-            <a:r>
-              <a:rPr lang="en-GB" sz="2400" dirty="0" smtClean="0"/>
-              <a:t>A </a:t>
-            </a:r>
-            <a:r>
-              <a:rPr lang="en-GB" sz="2400" dirty="0" smtClean="0"/>
-              <a:t>workspace is a folder that eclipse creates to group all of projects related to a single application/product</a:t>
-            </a:r>
-            <a:r>
-              <a:rPr lang="en-GB" sz="2400" dirty="0" smtClean="0"/>
-              <a:t>.</a:t>
-            </a:r>
-          </a:p>
-          <a:p>
-            <a:pPr marL="0">
-              <a:spcBef>
-                <a:spcPts val="0"/>
-              </a:spcBef>
-            </a:pPr>
-            <a:endParaRPr lang="en-GB" sz="2400" b="1" dirty="0" smtClean="0"/>
-          </a:p>
-          <a:p>
-            <a:pPr marL="0">
-              <a:spcBef>
-                <a:spcPts val="0"/>
-              </a:spcBef>
-            </a:pPr>
-            <a:r>
-              <a:rPr lang="en-GB" sz="2400" dirty="0" smtClean="0"/>
-              <a:t>Create  project with reverse DNS: “edu.uprm.ece.icom4015.project”  </a:t>
-            </a:r>
-            <a:endParaRPr lang="en-GB" sz="2400" dirty="0" smtClean="0"/>
-          </a:p>
-          <a:p>
-            <a:pPr marL="0">
-              <a:spcBef>
-                <a:spcPts val="0"/>
-              </a:spcBef>
-            </a:pPr>
-            <a:endParaRPr lang="en-GB" sz="2400" dirty="0" smtClean="0"/>
-          </a:p>
-          <a:p>
-            <a:pPr marL="0">
-              <a:spcBef>
-                <a:spcPts val="0"/>
-              </a:spcBef>
-            </a:pPr>
-            <a:r>
-              <a:rPr lang="en-GB" sz="2400" dirty="0" smtClean="0"/>
-              <a:t>See reference 3.</a:t>
-            </a:r>
-            <a:endParaRPr lang="en-GB" sz="2400" dirty="0"/>
-          </a:p>
-        </p:txBody>
-      </p:sp>
+            <a:pPr algn="ctr"/>
+            <a:r>
+              <a:rPr lang="en-GB" dirty="0" smtClean="0"/>
+              <a:t>Start</a:t>
+            </a:r>
+          </a:p>
+        </p:txBody>
+      </p:sp>
+      <p:sp>
+        <p:nvSpPr>
+          <p:cNvPr id="9" name="Flowchart: Card 8"/>
+          <p:cNvSpPr/>
+          <p:nvPr/>
+        </p:nvSpPr>
+        <p:spPr>
+          <a:xfrm>
+            <a:off x="1447800" y="1905000"/>
+            <a:ext cx="1219200" cy="381000"/>
+          </a:xfrm>
+          <a:prstGeom prst="flowChartPunchedCard">
+            <a:avLst/>
+          </a:prstGeom>
+        </p:spPr>
+        <p:style>
+          <a:lnRef idx="1">
+            <a:schemeClr val="accent1"/>
+          </a:lnRef>
+          <a:fillRef idx="3">
+            <a:schemeClr val="accent1"/>
+          </a:fillRef>
+          <a:effectRef idx="2">
+            <a:schemeClr val="accent1"/>
+          </a:effectRef>
+          <a:fontRef idx="minor">
+            <a:schemeClr val="lt1"/>
+          </a:fontRef>
+        </p:style>
+        <p:txBody>
+          <a:bodyPr rtlCol="0" anchor="ctr"/>
+          <a:lstStyle/>
+          <a:p>
+            <a:pPr algn="ctr"/>
+            <a:r>
+              <a:rPr lang="en-GB" dirty="0" smtClean="0"/>
+              <a:t>number</a:t>
+            </a:r>
+            <a:endParaRPr lang="en-GB" dirty="0"/>
+          </a:p>
+        </p:txBody>
+      </p:sp>
+      <p:grpSp>
+        <p:nvGrpSpPr>
+          <p:cNvPr id="23" name="Group 22"/>
+          <p:cNvGrpSpPr/>
+          <p:nvPr/>
+        </p:nvGrpSpPr>
+        <p:grpSpPr>
+          <a:xfrm>
+            <a:off x="990600" y="2667000"/>
+            <a:ext cx="2895600" cy="1219200"/>
+            <a:chOff x="3339737" y="2590800"/>
+            <a:chExt cx="3143794" cy="1295400"/>
+          </a:xfrm>
+        </p:grpSpPr>
+        <p:grpSp>
+          <p:nvGrpSpPr>
+            <p:cNvPr id="18" name="Group 17"/>
+            <p:cNvGrpSpPr/>
+            <p:nvPr/>
+          </p:nvGrpSpPr>
+          <p:grpSpPr>
+            <a:xfrm>
+              <a:off x="3339737" y="2590800"/>
+              <a:ext cx="3143794" cy="1295400"/>
+              <a:chOff x="3339737" y="2590800"/>
+              <a:chExt cx="3143794" cy="1295400"/>
+            </a:xfrm>
+          </p:grpSpPr>
+          <p:sp>
+            <p:nvSpPr>
+              <p:cNvPr id="10" name="Flowchart: Delay 9"/>
+              <p:cNvSpPr/>
+              <p:nvPr/>
+            </p:nvSpPr>
+            <p:spPr>
+              <a:xfrm>
+                <a:off x="3339737" y="2590800"/>
+                <a:ext cx="3143794" cy="1295400"/>
+              </a:xfrm>
+              <a:prstGeom prst="flowChartDelay">
+                <a:avLst/>
+              </a:prstGeom>
+            </p:spPr>
+            <p:style>
+              <a:lnRef idx="1">
+                <a:schemeClr val="accent1"/>
+              </a:lnRef>
+              <a:fillRef idx="3">
+                <a:schemeClr val="accent1"/>
+              </a:fillRef>
+              <a:effectRef idx="2">
+                <a:schemeClr val="accent1"/>
+              </a:effectRef>
+              <a:fontRef idx="minor">
+                <a:schemeClr val="lt1"/>
+              </a:fontRef>
+            </p:style>
+            <p:txBody>
+              <a:bodyPr rtlCol="0" anchor="ctr"/>
+              <a:lstStyle/>
+              <a:p>
+                <a:pPr algn="ctr"/>
+                <a:endParaRPr lang="en-GB"/>
+              </a:p>
+            </p:txBody>
+          </p:sp>
+          <p:cxnSp>
+            <p:nvCxnSpPr>
+              <p:cNvPr id="17" name="Straight Connector 16"/>
+              <p:cNvCxnSpPr>
+                <a:stCxn id="13" idx="1"/>
+                <a:endCxn id="10" idx="1"/>
+              </p:cNvCxnSpPr>
+              <p:nvPr/>
+            </p:nvCxnSpPr>
+            <p:spPr>
+              <a:xfrm flipH="1" flipV="1">
+                <a:off x="3339737" y="3238500"/>
+                <a:ext cx="1156063" cy="5708"/>
+              </a:xfrm>
+              <a:prstGeom prst="line">
+                <a:avLst/>
+              </a:prstGeom>
+              <a:ln>
+                <a:solidFill>
+                  <a:schemeClr val="tx1"/>
+                </a:solidFill>
+              </a:ln>
+            </p:spPr>
+            <p:style>
+              <a:lnRef idx="2">
+                <a:schemeClr val="accent1"/>
+              </a:lnRef>
+              <a:fillRef idx="0">
+                <a:schemeClr val="accent1"/>
+              </a:fillRef>
+              <a:effectRef idx="1">
+                <a:schemeClr val="accent1"/>
+              </a:effectRef>
+              <a:fontRef idx="minor">
+                <a:schemeClr val="tx1"/>
+              </a:fontRef>
+            </p:style>
+          </p:cxnSp>
+        </p:grpSp>
+        <p:sp>
+          <p:nvSpPr>
+            <p:cNvPr id="11" name="TextBox 10"/>
+            <p:cNvSpPr txBox="1"/>
+            <p:nvPr/>
+          </p:nvSpPr>
+          <p:spPr>
+            <a:xfrm>
+              <a:off x="3563161" y="2754868"/>
+              <a:ext cx="764385" cy="392415"/>
+            </a:xfrm>
+            <a:prstGeom prst="rect">
+              <a:avLst/>
+            </a:prstGeom>
+            <a:noFill/>
+          </p:spPr>
+          <p:txBody>
+            <a:bodyPr wrap="none" rtlCol="0">
+              <a:spAutoFit/>
+            </a:bodyPr>
+            <a:lstStyle/>
+            <a:p>
+              <a:r>
+                <a:rPr lang="en-GB" dirty="0" smtClean="0">
+                  <a:solidFill>
+                    <a:schemeClr val="bg1"/>
+                  </a:solidFill>
+                </a:rPr>
+                <a:t>i</a:t>
+              </a:r>
+              <a:r>
+                <a:rPr lang="en-GB" dirty="0" smtClean="0">
+                  <a:solidFill>
+                    <a:schemeClr val="bg1"/>
+                  </a:solidFill>
+                </a:rPr>
+                <a:t> &lt;- 2</a:t>
+              </a:r>
+              <a:endParaRPr lang="en-GB" dirty="0">
+                <a:solidFill>
+                  <a:schemeClr val="bg1"/>
+                </a:solidFill>
+              </a:endParaRPr>
+            </a:p>
+          </p:txBody>
+        </p:sp>
+        <p:sp>
+          <p:nvSpPr>
+            <p:cNvPr id="12" name="TextBox 11"/>
+            <p:cNvSpPr txBox="1"/>
+            <p:nvPr/>
+          </p:nvSpPr>
+          <p:spPr>
+            <a:xfrm>
+              <a:off x="3529613" y="3352800"/>
+              <a:ext cx="966272" cy="392415"/>
+            </a:xfrm>
+            <a:prstGeom prst="rect">
+              <a:avLst/>
+            </a:prstGeom>
+            <a:noFill/>
+          </p:spPr>
+          <p:txBody>
+            <a:bodyPr wrap="none" rtlCol="0">
+              <a:spAutoFit/>
+            </a:bodyPr>
+            <a:lstStyle/>
+            <a:p>
+              <a:r>
+                <a:rPr lang="en-GB" dirty="0" smtClean="0">
+                  <a:solidFill>
+                    <a:schemeClr val="bg1"/>
+                  </a:solidFill>
+                </a:rPr>
+                <a:t>i &lt;- i+1</a:t>
+              </a:r>
+              <a:endParaRPr lang="en-GB" dirty="0">
+                <a:solidFill>
+                  <a:schemeClr val="bg1"/>
+                </a:solidFill>
+              </a:endParaRPr>
+            </a:p>
+          </p:txBody>
+        </p:sp>
+        <p:sp>
+          <p:nvSpPr>
+            <p:cNvPr id="13" name="TextBox 12"/>
+            <p:cNvSpPr txBox="1"/>
+            <p:nvPr/>
+          </p:nvSpPr>
+          <p:spPr>
+            <a:xfrm>
+              <a:off x="4495800" y="3048000"/>
+              <a:ext cx="1975706" cy="392415"/>
+            </a:xfrm>
+            <a:prstGeom prst="rect">
+              <a:avLst/>
+            </a:prstGeom>
+            <a:noFill/>
+          </p:spPr>
+          <p:txBody>
+            <a:bodyPr wrap="none" rtlCol="0">
+              <a:spAutoFit/>
+            </a:bodyPr>
+            <a:lstStyle/>
+            <a:p>
+              <a:r>
+                <a:rPr lang="en-GB" dirty="0" err="1" smtClean="0">
+                  <a:solidFill>
+                    <a:schemeClr val="bg1"/>
+                  </a:solidFill>
+                </a:rPr>
+                <a:t>i</a:t>
+              </a:r>
+              <a:r>
+                <a:rPr lang="en-GB" dirty="0" smtClean="0">
+                  <a:solidFill>
+                    <a:schemeClr val="bg1"/>
+                  </a:solidFill>
+                </a:rPr>
+                <a:t> &lt; </a:t>
+              </a:r>
+              <a:r>
+                <a:rPr lang="en-GB" dirty="0" err="1" smtClean="0">
+                  <a:solidFill>
+                    <a:schemeClr val="bg1"/>
+                  </a:solidFill>
+                </a:rPr>
+                <a:t>sqrt</a:t>
+              </a:r>
+              <a:r>
+                <a:rPr lang="en-GB" dirty="0" smtClean="0">
+                  <a:solidFill>
+                    <a:schemeClr val="bg1"/>
+                  </a:solidFill>
+                </a:rPr>
+                <a:t>(number)</a:t>
+              </a:r>
+              <a:endParaRPr lang="en-GB" dirty="0">
+                <a:solidFill>
+                  <a:schemeClr val="bg1"/>
+                </a:solidFill>
+              </a:endParaRPr>
+            </a:p>
+          </p:txBody>
+        </p:sp>
+        <p:cxnSp>
+          <p:nvCxnSpPr>
+            <p:cNvPr id="15" name="Straight Connector 14"/>
+            <p:cNvCxnSpPr/>
+            <p:nvPr/>
+          </p:nvCxnSpPr>
+          <p:spPr>
+            <a:xfrm>
+              <a:off x="4419600" y="2590800"/>
+              <a:ext cx="0" cy="1295400"/>
+            </a:xfrm>
+            <a:prstGeom prst="line">
+              <a:avLst/>
+            </a:prstGeom>
+            <a:ln>
+              <a:solidFill>
+                <a:schemeClr val="tx1"/>
+              </a:solidFill>
+            </a:ln>
+          </p:spPr>
+          <p:style>
+            <a:lnRef idx="2">
+              <a:schemeClr val="accent1"/>
+            </a:lnRef>
+            <a:fillRef idx="0">
+              <a:schemeClr val="accent1"/>
+            </a:fillRef>
+            <a:effectRef idx="1">
+              <a:schemeClr val="accent1"/>
+            </a:effectRef>
+            <a:fontRef idx="minor">
+              <a:schemeClr val="tx1"/>
+            </a:fontRef>
+          </p:style>
+        </p:cxnSp>
+      </p:grpSp>
+      <p:sp>
+        <p:nvSpPr>
+          <p:cNvPr id="24" name="Rectangle 23"/>
+          <p:cNvSpPr/>
+          <p:nvPr/>
+        </p:nvSpPr>
+        <p:spPr>
+          <a:xfrm>
+            <a:off x="1219200" y="4495800"/>
+            <a:ext cx="2514600" cy="533400"/>
+          </a:xfrm>
+          <a:prstGeom prst="rect">
+            <a:avLst/>
+          </a:prstGeom>
+        </p:spPr>
+        <p:style>
+          <a:lnRef idx="1">
+            <a:schemeClr val="accent1"/>
+          </a:lnRef>
+          <a:fillRef idx="3">
+            <a:schemeClr val="accent1"/>
+          </a:fillRef>
+          <a:effectRef idx="2">
+            <a:schemeClr val="accent1"/>
+          </a:effectRef>
+          <a:fontRef idx="minor">
+            <a:schemeClr val="lt1"/>
+          </a:fontRef>
+        </p:style>
+        <p:txBody>
+          <a:bodyPr rtlCol="0" anchor="ctr"/>
+          <a:lstStyle/>
+          <a:p>
+            <a:pPr algn="ctr"/>
+            <a:r>
+              <a:rPr lang="en-GB" dirty="0" smtClean="0"/>
+              <a:t>Modulus &lt;- number % </a:t>
+            </a:r>
+            <a:r>
+              <a:rPr lang="en-GB" dirty="0" err="1" smtClean="0"/>
+              <a:t>i</a:t>
+            </a:r>
+            <a:r>
+              <a:rPr lang="en-GB" dirty="0" smtClean="0"/>
+              <a:t> </a:t>
+            </a:r>
+            <a:endParaRPr lang="en-GB" dirty="0"/>
+          </a:p>
+        </p:txBody>
+      </p:sp>
+      <p:sp>
+        <p:nvSpPr>
+          <p:cNvPr id="29" name="Flowchart: Terminator 28"/>
+          <p:cNvSpPr/>
+          <p:nvPr/>
+        </p:nvSpPr>
+        <p:spPr>
+          <a:xfrm>
+            <a:off x="990600" y="5410200"/>
+            <a:ext cx="2895600" cy="457200"/>
+          </a:xfrm>
+          <a:prstGeom prst="flowChartTerminator">
+            <a:avLst/>
+          </a:prstGeom>
+        </p:spPr>
+        <p:style>
+          <a:lnRef idx="1">
+            <a:schemeClr val="accent1"/>
+          </a:lnRef>
+          <a:fillRef idx="3">
+            <a:schemeClr val="accent1"/>
+          </a:fillRef>
+          <a:effectRef idx="2">
+            <a:schemeClr val="accent1"/>
+          </a:effectRef>
+          <a:fontRef idx="minor">
+            <a:schemeClr val="lt1"/>
+          </a:fontRef>
+        </p:style>
+        <p:txBody>
+          <a:bodyPr rtlCol="0" anchor="ctr"/>
+          <a:lstStyle/>
+          <a:p>
+            <a:pPr algn="ctr"/>
+            <a:r>
+              <a:rPr lang="en-GB" dirty="0" smtClean="0"/>
+              <a:t>Modulus == 0</a:t>
+            </a:r>
+            <a:endParaRPr lang="en-GB" dirty="0"/>
+          </a:p>
+        </p:txBody>
+      </p:sp>
+      <p:sp>
+        <p:nvSpPr>
+          <p:cNvPr id="32" name="Flowchart: Document 31"/>
+          <p:cNvSpPr/>
+          <p:nvPr/>
+        </p:nvSpPr>
+        <p:spPr>
+          <a:xfrm>
+            <a:off x="5029200" y="4876800"/>
+            <a:ext cx="2057400" cy="685800"/>
+          </a:xfrm>
+          <a:prstGeom prst="flowChartDocument">
+            <a:avLst/>
+          </a:prstGeom>
+        </p:spPr>
+        <p:style>
+          <a:lnRef idx="1">
+            <a:schemeClr val="accent1"/>
+          </a:lnRef>
+          <a:fillRef idx="3">
+            <a:schemeClr val="accent1"/>
+          </a:fillRef>
+          <a:effectRef idx="2">
+            <a:schemeClr val="accent1"/>
+          </a:effectRef>
+          <a:fontRef idx="minor">
+            <a:schemeClr val="lt1"/>
+          </a:fontRef>
+        </p:style>
+        <p:txBody>
+          <a:bodyPr rtlCol="0" anchor="ctr"/>
+          <a:lstStyle/>
+          <a:p>
+            <a:pPr algn="ctr"/>
+            <a:r>
+              <a:rPr lang="en-GB" dirty="0" smtClean="0"/>
+              <a:t>“Not a prime”</a:t>
+            </a:r>
+            <a:endParaRPr lang="en-GB" dirty="0"/>
+          </a:p>
+        </p:txBody>
+      </p:sp>
+      <p:sp>
+        <p:nvSpPr>
+          <p:cNvPr id="33" name="Oval 32"/>
+          <p:cNvSpPr/>
+          <p:nvPr/>
+        </p:nvSpPr>
+        <p:spPr>
+          <a:xfrm>
+            <a:off x="7086600" y="2743200"/>
+            <a:ext cx="1371600" cy="533400"/>
+          </a:xfrm>
+          <a:prstGeom prst="ellipse">
+            <a:avLst/>
+          </a:prstGeom>
+        </p:spPr>
+        <p:style>
+          <a:lnRef idx="1">
+            <a:schemeClr val="accent1"/>
+          </a:lnRef>
+          <a:fillRef idx="3">
+            <a:schemeClr val="accent1"/>
+          </a:fillRef>
+          <a:effectRef idx="2">
+            <a:schemeClr val="accent1"/>
+          </a:effectRef>
+          <a:fontRef idx="minor">
+            <a:schemeClr val="lt1"/>
+          </a:fontRef>
+        </p:style>
+        <p:txBody>
+          <a:bodyPr rtlCol="0" anchor="ctr"/>
+          <a:lstStyle/>
+          <a:p>
+            <a:pPr algn="ctr"/>
+            <a:r>
+              <a:rPr lang="en-GB" dirty="0" smtClean="0"/>
+              <a:t>End</a:t>
+            </a:r>
+          </a:p>
+        </p:txBody>
+      </p:sp>
+      <p:cxnSp>
+        <p:nvCxnSpPr>
+          <p:cNvPr id="35" name="Elbow Connector 34"/>
+          <p:cNvCxnSpPr>
+            <a:stCxn id="8" idx="4"/>
+            <a:endCxn id="9" idx="0"/>
+          </p:cNvCxnSpPr>
+          <p:nvPr/>
+        </p:nvCxnSpPr>
+        <p:spPr>
+          <a:xfrm rot="5400000">
+            <a:off x="1866900" y="1714500"/>
+            <a:ext cx="381000" cy="12700"/>
+          </a:xfrm>
+          <a:prstGeom prst="bentConnector3">
+            <a:avLst>
+              <a:gd name="adj1" fmla="val 50000"/>
+            </a:avLst>
+          </a:prstGeom>
+          <a:ln>
+            <a:tailEnd type="arrow"/>
+          </a:ln>
+        </p:spPr>
+        <p:style>
+          <a:lnRef idx="2">
+            <a:schemeClr val="accent1"/>
+          </a:lnRef>
+          <a:fillRef idx="0">
+            <a:schemeClr val="accent1"/>
+          </a:fillRef>
+          <a:effectRef idx="1">
+            <a:schemeClr val="accent1"/>
+          </a:effectRef>
+          <a:fontRef idx="minor">
+            <a:schemeClr val="tx1"/>
+          </a:fontRef>
+        </p:style>
+      </p:cxnSp>
+      <p:cxnSp>
+        <p:nvCxnSpPr>
+          <p:cNvPr id="37" name="Straight Arrow Connector 36"/>
+          <p:cNvCxnSpPr>
+            <a:stCxn id="10" idx="2"/>
+            <a:endCxn id="24" idx="0"/>
+          </p:cNvCxnSpPr>
+          <p:nvPr/>
+        </p:nvCxnSpPr>
+        <p:spPr>
+          <a:xfrm>
+            <a:off x="2438400" y="3886200"/>
+            <a:ext cx="38100" cy="609600"/>
+          </a:xfrm>
+          <a:prstGeom prst="straightConnector1">
+            <a:avLst/>
+          </a:prstGeom>
+          <a:ln>
+            <a:tailEnd type="arrow"/>
+          </a:ln>
+        </p:spPr>
+        <p:style>
+          <a:lnRef idx="2">
+            <a:schemeClr val="accent1"/>
+          </a:lnRef>
+          <a:fillRef idx="0">
+            <a:schemeClr val="accent1"/>
+          </a:fillRef>
+          <a:effectRef idx="1">
+            <a:schemeClr val="accent1"/>
+          </a:effectRef>
+          <a:fontRef idx="minor">
+            <a:schemeClr val="tx1"/>
+          </a:fontRef>
+        </p:style>
+      </p:cxnSp>
+      <p:cxnSp>
+        <p:nvCxnSpPr>
+          <p:cNvPr id="42" name="Elbow Connector 41"/>
+          <p:cNvCxnSpPr>
+            <a:stCxn id="9" idx="2"/>
+            <a:endCxn id="10" idx="0"/>
+          </p:cNvCxnSpPr>
+          <p:nvPr/>
+        </p:nvCxnSpPr>
+        <p:spPr>
+          <a:xfrm rot="16200000" flipH="1">
+            <a:off x="2057400" y="2286000"/>
+            <a:ext cx="381000" cy="381000"/>
+          </a:xfrm>
+          <a:prstGeom prst="bentConnector3">
+            <a:avLst>
+              <a:gd name="adj1" fmla="val 50000"/>
+            </a:avLst>
+          </a:prstGeom>
+          <a:ln>
+            <a:tailEnd type="arrow"/>
+          </a:ln>
+        </p:spPr>
+        <p:style>
+          <a:lnRef idx="2">
+            <a:schemeClr val="accent1"/>
+          </a:lnRef>
+          <a:fillRef idx="0">
+            <a:schemeClr val="accent1"/>
+          </a:fillRef>
+          <a:effectRef idx="1">
+            <a:schemeClr val="accent1"/>
+          </a:effectRef>
+          <a:fontRef idx="minor">
+            <a:schemeClr val="tx1"/>
+          </a:fontRef>
+        </p:style>
+      </p:cxnSp>
+      <p:cxnSp>
+        <p:nvCxnSpPr>
+          <p:cNvPr id="45" name="Elbow Connector 44"/>
+          <p:cNvCxnSpPr>
+            <a:stCxn id="24" idx="2"/>
+            <a:endCxn id="29" idx="0"/>
+          </p:cNvCxnSpPr>
+          <p:nvPr/>
+        </p:nvCxnSpPr>
+        <p:spPr>
+          <a:xfrm rot="5400000">
+            <a:off x="2266950" y="5200650"/>
+            <a:ext cx="381000" cy="38100"/>
+          </a:xfrm>
+          <a:prstGeom prst="bentConnector3">
+            <a:avLst>
+              <a:gd name="adj1" fmla="val 50000"/>
+            </a:avLst>
+          </a:prstGeom>
+          <a:ln>
+            <a:tailEnd type="arrow"/>
+          </a:ln>
+        </p:spPr>
+        <p:style>
+          <a:lnRef idx="2">
+            <a:schemeClr val="accent1"/>
+          </a:lnRef>
+          <a:fillRef idx="0">
+            <a:schemeClr val="accent1"/>
+          </a:fillRef>
+          <a:effectRef idx="1">
+            <a:schemeClr val="accent1"/>
+          </a:effectRef>
+          <a:fontRef idx="minor">
+            <a:schemeClr val="tx1"/>
+          </a:fontRef>
+        </p:style>
+      </p:cxnSp>
+      <p:cxnSp>
+        <p:nvCxnSpPr>
+          <p:cNvPr id="47" name="Elbow Connector 46"/>
+          <p:cNvCxnSpPr>
+            <a:stCxn id="29" idx="3"/>
+            <a:endCxn id="32" idx="1"/>
+          </p:cNvCxnSpPr>
+          <p:nvPr/>
+        </p:nvCxnSpPr>
+        <p:spPr>
+          <a:xfrm flipV="1">
+            <a:off x="3886200" y="5219700"/>
+            <a:ext cx="1143000" cy="419100"/>
+          </a:xfrm>
+          <a:prstGeom prst="bentConnector3">
+            <a:avLst>
+              <a:gd name="adj1" fmla="val 50000"/>
+            </a:avLst>
+          </a:prstGeom>
+          <a:ln>
+            <a:tailEnd type="arrow"/>
+          </a:ln>
+        </p:spPr>
+        <p:style>
+          <a:lnRef idx="2">
+            <a:schemeClr val="accent1"/>
+          </a:lnRef>
+          <a:fillRef idx="0">
+            <a:schemeClr val="accent1"/>
+          </a:fillRef>
+          <a:effectRef idx="1">
+            <a:schemeClr val="accent1"/>
+          </a:effectRef>
+          <a:fontRef idx="minor">
+            <a:schemeClr val="tx1"/>
+          </a:fontRef>
+        </p:style>
+      </p:cxnSp>
+      <p:cxnSp>
+        <p:nvCxnSpPr>
+          <p:cNvPr id="49" name="Elbow Connector 48"/>
+          <p:cNvCxnSpPr>
+            <a:stCxn id="32" idx="2"/>
+            <a:endCxn id="33" idx="6"/>
+          </p:cNvCxnSpPr>
+          <p:nvPr/>
+        </p:nvCxnSpPr>
+        <p:spPr>
+          <a:xfrm rot="5400000" flipH="1" flipV="1">
+            <a:off x="6004369" y="3063431"/>
+            <a:ext cx="2507361" cy="2400300"/>
+          </a:xfrm>
+          <a:prstGeom prst="bentConnector4">
+            <a:avLst>
+              <a:gd name="adj1" fmla="val -10925"/>
+              <a:gd name="adj2" fmla="val 109524"/>
+            </a:avLst>
+          </a:prstGeom>
+          <a:ln>
+            <a:tailEnd type="arrow"/>
+          </a:ln>
+        </p:spPr>
+        <p:style>
+          <a:lnRef idx="2">
+            <a:schemeClr val="accent1"/>
+          </a:lnRef>
+          <a:fillRef idx="0">
+            <a:schemeClr val="accent1"/>
+          </a:fillRef>
+          <a:effectRef idx="1">
+            <a:schemeClr val="accent1"/>
+          </a:effectRef>
+          <a:fontRef idx="minor">
+            <a:schemeClr val="tx1"/>
+          </a:fontRef>
+        </p:style>
+      </p:cxnSp>
+      <p:cxnSp>
+        <p:nvCxnSpPr>
+          <p:cNvPr id="53" name="Shape 52"/>
+          <p:cNvCxnSpPr>
+            <a:stCxn id="29" idx="2"/>
+            <a:endCxn id="10" idx="1"/>
+          </p:cNvCxnSpPr>
+          <p:nvPr/>
+        </p:nvCxnSpPr>
+        <p:spPr>
+          <a:xfrm rot="5400000" flipH="1">
+            <a:off x="419100" y="3848100"/>
+            <a:ext cx="2590800" cy="1447800"/>
+          </a:xfrm>
+          <a:prstGeom prst="bentConnector4">
+            <a:avLst>
+              <a:gd name="adj1" fmla="val -8824"/>
+              <a:gd name="adj2" fmla="val 131888"/>
+            </a:avLst>
+          </a:prstGeom>
+          <a:ln>
+            <a:tailEnd type="arrow"/>
+          </a:ln>
+        </p:spPr>
+        <p:style>
+          <a:lnRef idx="2">
+            <a:schemeClr val="accent1"/>
+          </a:lnRef>
+          <a:fillRef idx="0">
+            <a:schemeClr val="accent1"/>
+          </a:fillRef>
+          <a:effectRef idx="1">
+            <a:schemeClr val="accent1"/>
+          </a:effectRef>
+          <a:fontRef idx="minor">
+            <a:schemeClr val="tx1"/>
+          </a:fontRef>
+        </p:style>
+      </p:cxnSp>
+      <p:sp>
+        <p:nvSpPr>
+          <p:cNvPr id="59" name="Flowchart: Document 58"/>
+          <p:cNvSpPr/>
+          <p:nvPr/>
+        </p:nvSpPr>
+        <p:spPr>
+          <a:xfrm>
+            <a:off x="4495800" y="2895600"/>
+            <a:ext cx="2057400" cy="685800"/>
+          </a:xfrm>
+          <a:prstGeom prst="flowChartDocument">
+            <a:avLst/>
+          </a:prstGeom>
+        </p:spPr>
+        <p:style>
+          <a:lnRef idx="1">
+            <a:schemeClr val="accent1"/>
+          </a:lnRef>
+          <a:fillRef idx="3">
+            <a:schemeClr val="accent1"/>
+          </a:fillRef>
+          <a:effectRef idx="2">
+            <a:schemeClr val="accent1"/>
+          </a:effectRef>
+          <a:fontRef idx="minor">
+            <a:schemeClr val="lt1"/>
+          </a:fontRef>
+        </p:style>
+        <p:txBody>
+          <a:bodyPr rtlCol="0" anchor="ctr"/>
+          <a:lstStyle/>
+          <a:p>
+            <a:pPr algn="ctr"/>
+            <a:r>
+              <a:rPr lang="en-GB" dirty="0" smtClean="0"/>
+              <a:t>“Prime”</a:t>
+            </a:r>
+            <a:endParaRPr lang="en-GB" dirty="0"/>
+          </a:p>
+        </p:txBody>
+      </p:sp>
+      <p:cxnSp>
+        <p:nvCxnSpPr>
+          <p:cNvPr id="61" name="Elbow Connector 60"/>
+          <p:cNvCxnSpPr>
+            <a:stCxn id="59" idx="3"/>
+            <a:endCxn id="33" idx="2"/>
+          </p:cNvCxnSpPr>
+          <p:nvPr/>
+        </p:nvCxnSpPr>
+        <p:spPr>
+          <a:xfrm flipV="1">
+            <a:off x="6553200" y="3009900"/>
+            <a:ext cx="533400" cy="228600"/>
+          </a:xfrm>
+          <a:prstGeom prst="bentConnector3">
+            <a:avLst>
+              <a:gd name="adj1" fmla="val 50000"/>
+            </a:avLst>
+          </a:prstGeom>
+          <a:ln>
+            <a:tailEnd type="arrow"/>
+          </a:ln>
+        </p:spPr>
+        <p:style>
+          <a:lnRef idx="2">
+            <a:schemeClr val="accent1"/>
+          </a:lnRef>
+          <a:fillRef idx="0">
+            <a:schemeClr val="accent1"/>
+          </a:fillRef>
+          <a:effectRef idx="1">
+            <a:schemeClr val="accent1"/>
+          </a:effectRef>
+          <a:fontRef idx="minor">
+            <a:schemeClr val="tx1"/>
+          </a:fontRef>
+        </p:style>
+      </p:cxnSp>
+      <p:cxnSp>
+        <p:nvCxnSpPr>
+          <p:cNvPr id="63" name="Straight Arrow Connector 62"/>
+          <p:cNvCxnSpPr>
+            <a:stCxn id="10" idx="3"/>
+            <a:endCxn id="59" idx="1"/>
+          </p:cNvCxnSpPr>
+          <p:nvPr/>
+        </p:nvCxnSpPr>
+        <p:spPr>
+          <a:xfrm flipV="1">
+            <a:off x="3886200" y="3238500"/>
+            <a:ext cx="609600" cy="38100"/>
+          </a:xfrm>
+          <a:prstGeom prst="straightConnector1">
+            <a:avLst/>
+          </a:prstGeom>
+          <a:ln>
+            <a:tailEnd type="arrow"/>
+          </a:ln>
+        </p:spPr>
+        <p:style>
+          <a:lnRef idx="2">
+            <a:schemeClr val="accent1"/>
+          </a:lnRef>
+          <a:fillRef idx="0">
+            <a:schemeClr val="accent1"/>
+          </a:fillRef>
+          <a:effectRef idx="1">
+            <a:schemeClr val="accent1"/>
+          </a:effectRef>
+          <a:fontRef idx="minor">
+            <a:schemeClr val="tx1"/>
+          </a:fontRef>
+        </p:style>
+      </p:cxnSp>
     </p:spTree>
   </p:cSld>
   <p:clrMapOvr>
     <a:masterClrMapping/>
   </p:clrMapOvr>
-  <p:timing>
-    <p:tnLst>
-      <p:par>
-        <p:cTn id="1" dur="indefinite" restart="never" nodeType="tmRoot"/>
-      </p:par>
-    </p:tnLst>
-  </p:timing>
 </p:sld>
 </file>
 
@@ -12476,63 +13135,134 @@
       </p:grpSpPr>
       <p:sp>
         <p:nvSpPr>
-          <p:cNvPr id="7" name="Title 6"/>
-          <p:cNvSpPr>
-            <a:spLocks noGrp="1"/>
-          </p:cNvSpPr>
-          <p:nvPr>
-            <p:ph type="ctrTitle"/>
-          </p:nvPr>
-        </p:nvSpPr>
-        <p:spPr/>
-        <p:txBody>
-          <a:bodyPr/>
+          <p:cNvPr id="39938" name="Text Box 6"/>
+          <p:cNvSpPr txBox="1">
+            <a:spLocks noChangeArrowheads="1"/>
+          </p:cNvSpPr>
+          <p:nvPr/>
+        </p:nvSpPr>
+        <p:spPr bwMode="auto">
+          <a:xfrm>
+            <a:off x="0" y="304800"/>
+            <a:ext cx="7010400" cy="584775"/>
+          </a:xfrm>
+          <a:prstGeom prst="rect">
+            <a:avLst/>
+          </a:prstGeom>
+          <a:noFill/>
+          <a:ln w="9525">
+            <a:noFill/>
+            <a:miter lim="800000"/>
+            <a:headEnd/>
+            <a:tailEnd/>
+          </a:ln>
+        </p:spPr>
+        <p:txBody>
+          <a:bodyPr>
+            <a:spAutoFit/>
+          </a:bodyPr>
           <a:lstStyle/>
           <a:p>
             <a:r>
-              <a:rPr lang="en-US" b="1" dirty="0" smtClean="0">
+              <a:rPr lang="en-GB" sz="3200" b="1" dirty="0" smtClean="0">
                 <a:latin typeface="Lucida Sans" pitchFamily="34" charset="0"/>
               </a:rPr>
-              <a:t>Hello </a:t>
-            </a:r>
-            <a:r>
-              <a:rPr lang="en-US" b="1" dirty="0" smtClean="0">
-                <a:latin typeface="Lucida Sans" pitchFamily="34" charset="0"/>
-              </a:rPr>
-              <a:t>World</a:t>
-            </a:r>
-            <a:endParaRPr lang="en-GB" dirty="0"/>
-          </a:p>
-        </p:txBody>
-      </p:sp>
-      <p:sp>
-        <p:nvSpPr>
-          <p:cNvPr id="8" name="Subtitle 7"/>
-          <p:cNvSpPr>
-            <a:spLocks noGrp="1"/>
-          </p:cNvSpPr>
-          <p:nvPr>
-            <p:ph type="subTitle" idx="1"/>
-          </p:nvPr>
-        </p:nvSpPr>
-        <p:spPr/>
+              <a:t>Eclipse IDE</a:t>
+            </a:r>
+            <a:endParaRPr lang="en-US" sz="3200" b="1" dirty="0">
+              <a:latin typeface="Lucida Sans" pitchFamily="34" charset="0"/>
+            </a:endParaRPr>
+          </a:p>
+        </p:txBody>
+      </p:sp>
+      <p:sp>
+        <p:nvSpPr>
+          <p:cNvPr id="4" name="Content Placeholder 3"/>
+          <p:cNvSpPr>
+            <a:spLocks noGrp="1"/>
+          </p:cNvSpPr>
+          <p:nvPr>
+            <p:ph idx="1"/>
+          </p:nvPr>
+        </p:nvSpPr>
+        <p:spPr>
+          <a:xfrm>
+            <a:off x="0" y="838200"/>
+            <a:ext cx="9144000" cy="5562600"/>
+          </a:xfrm>
+        </p:spPr>
         <p:txBody>
           <a:bodyPr/>
           <a:lstStyle/>
           <a:p>
-            <a:r>
-              <a:rPr lang="en-GB" dirty="0" smtClean="0">
-                <a:solidFill>
-                  <a:schemeClr val="tx1"/>
-                </a:solidFill>
-              </a:rPr>
-              <a:t>Window =&gt; Cheat Sheets</a:t>
-            </a:r>
-            <a:endParaRPr lang="en-GB" dirty="0">
-              <a:solidFill>
-                <a:schemeClr val="tx1"/>
-              </a:solidFill>
-            </a:endParaRPr>
+            <a:pPr marL="0">
+              <a:spcBef>
+                <a:spcPts val="0"/>
+              </a:spcBef>
+              <a:buNone/>
+            </a:pPr>
+            <a:r>
+              <a:rPr lang="en-GB" sz="2400" dirty="0" smtClean="0"/>
+              <a:t>In contrast to your previous programming experience we will be using an Integrated Development Environment  called Eclipse. Because it’s an IDE it does way more than compile your code; it automates tasks and make your life easy. Eclipse sole purpose in life is to organize you and get you a workflow. </a:t>
+            </a:r>
+          </a:p>
+          <a:p>
+            <a:pPr marL="0">
+              <a:spcBef>
+                <a:spcPts val="0"/>
+              </a:spcBef>
+            </a:pPr>
+            <a:endParaRPr lang="en-GB" sz="2400" dirty="0" smtClean="0"/>
+          </a:p>
+          <a:p>
+            <a:pPr marL="0">
+              <a:spcBef>
+                <a:spcPts val="0"/>
+              </a:spcBef>
+            </a:pPr>
+            <a:r>
+              <a:rPr lang="en-GB" sz="2400" dirty="0" smtClean="0"/>
+              <a:t>A workspace is a folder that eclipse creates to group all of projects related to a single application/product.</a:t>
+            </a:r>
+          </a:p>
+          <a:p>
+            <a:pPr marL="0">
+              <a:spcBef>
+                <a:spcPts val="0"/>
+              </a:spcBef>
+            </a:pPr>
+            <a:endParaRPr lang="en-GB" sz="2400" b="1" dirty="0" smtClean="0"/>
+          </a:p>
+          <a:p>
+            <a:pPr marL="0">
+              <a:spcBef>
+                <a:spcPts val="0"/>
+              </a:spcBef>
+            </a:pPr>
+            <a:r>
+              <a:rPr lang="en-GB" sz="2400" dirty="0" smtClean="0"/>
+              <a:t>Create  project with reverse DNS: “edu.uprm.ece.icom4015.project”  </a:t>
+            </a:r>
+          </a:p>
+          <a:p>
+            <a:pPr marL="0">
+              <a:spcBef>
+                <a:spcPts val="0"/>
+              </a:spcBef>
+            </a:pPr>
+            <a:endParaRPr lang="en-GB" sz="2400" dirty="0" smtClean="0"/>
+          </a:p>
+          <a:p>
+            <a:pPr marL="0">
+              <a:spcBef>
+                <a:spcPts val="0"/>
+              </a:spcBef>
+            </a:pPr>
+            <a:r>
+              <a:rPr lang="en-GB" sz="2400" dirty="0" smtClean="0"/>
+              <a:t>See reference 3.</a:t>
+            </a:r>
+            <a:endParaRPr lang="en-GB" sz="2400" dirty="0"/>
           </a:p>
         </p:txBody>
       </p:sp>
@@ -12587,13 +13317,7 @@
               <a:rPr lang="en-US" b="1" dirty="0" smtClean="0">
                 <a:latin typeface="Lucida Sans" pitchFamily="34" charset="0"/>
               </a:rPr>
-              <a:t>Hello World </a:t>
-            </a:r>
-            <a:r>
-              <a:rPr lang="en-US" b="1" dirty="0" smtClean="0">
-                <a:latin typeface="Lucida Sans" pitchFamily="34" charset="0"/>
-              </a:rPr>
-              <a:t>SWT</a:t>
+              <a:t>Hello World</a:t>
             </a:r>
             <a:endParaRPr lang="en-GB" dirty="0"/>
           </a:p>
@@ -12622,9 +13346,11 @@
               </a:rPr>
               <a:t>Window =&gt; Cheat Sheets</a:t>
             </a:r>
-          </a:p>
-          <a:p>
-            <a:endParaRPr lang="en-GB" dirty="0"/>
+            <a:endParaRPr lang="en-GB" dirty="0">
+              <a:solidFill>
+                <a:schemeClr val="tx1"/>
+              </a:solidFill>
+            </a:endParaRPr>
           </a:p>
         </p:txBody>
       </p:sp>
@@ -12679,25 +13405,8 @@
               <a:rPr lang="en-US" b="1" dirty="0" smtClean="0">
                 <a:latin typeface="Lucida Sans" pitchFamily="34" charset="0"/>
               </a:rPr>
-              <a:t>From Scratch for the Do it Your-</a:t>
-            </a:r>
-            <a:r>
-              <a:rPr lang="en-US" b="1" dirty="0" err="1" smtClean="0">
-                <a:latin typeface="Lucida Sans" pitchFamily="34" charset="0"/>
-              </a:rPr>
-              <a:t>selfer</a:t>
-            </a:r>
-            <a:r>
-              <a:rPr lang="en-US" b="1" dirty="0" smtClean="0">
-                <a:latin typeface="Lucida Sans" pitchFamily="34" charset="0"/>
-              </a:rPr>
-              <a:t/>
-            </a:r>
-            <a:br>
-              <a:rPr lang="en-US" b="1" dirty="0" smtClean="0">
-                <a:latin typeface="Lucida Sans" pitchFamily="34" charset="0"/>
-              </a:rPr>
-            </a:br>
+              <a:t>Hello World SWT</a:t>
+            </a:r>
             <a:endParaRPr lang="en-GB" dirty="0"/>
           </a:p>
         </p:txBody>
@@ -12723,13 +13432,11 @@
                   <a:schemeClr val="tx1"/>
                 </a:solidFill>
               </a:rPr>
-              <a:t>Follow TA</a:t>
-            </a:r>
-            <a:endParaRPr lang="en-GB" dirty="0">
-              <a:solidFill>
-                <a:schemeClr val="tx1"/>
-              </a:solidFill>
-            </a:endParaRPr>
+              <a:t>Window =&gt; Cheat Sheets</a:t>
+            </a:r>
+          </a:p>
+          <a:p>
+            <a:endParaRPr lang="en-GB" dirty="0"/>
           </a:p>
         </p:txBody>
       </p:sp>

</xml_diff>